<commit_message>
uploaded for Spring 2022
</commit_message>
<xml_diff>
--- a/cyber_security.pptx
+++ b/cyber_security.pptx
@@ -169,13 +169,67 @@
 <file path=ppt/revisionInfo.xml><?xml version="1.0" encoding="utf-8"?>
 <p1510:revInfo xmlns:a="http://schemas.openxmlformats.org/drawingml/2006/main" xmlns:r="http://schemas.openxmlformats.org/officeDocument/2006/relationships" xmlns:p1510="http://schemas.microsoft.com/office/powerpoint/2015/10/main">
   <p1510:revLst>
-    <p1510:client id="{7AE9E466-928B-473C-A199-A10A68D87540}" v="1" dt="2021-10-19T16:50:45.540"/>
+    <p1510:client id="{227FD2A3-76D9-4BBB-BFDA-3F0C600BA77A}" v="1" dt="2022-03-04T16:36:55.559"/>
   </p1510:revLst>
 </p1510:revInfo>
 </file>
 
 <file path=ppt/changesInfos/changesInfo1.xml><?xml version="1.0" encoding="utf-8"?>
 <pc:chgInfo xmlns:a="http://schemas.openxmlformats.org/drawingml/2006/main" xmlns:r="http://schemas.openxmlformats.org/officeDocument/2006/relationships" xmlns:ac="http://schemas.microsoft.com/office/drawing/2013/main/command" xmlns:pc="http://schemas.microsoft.com/office/powerpoint/2013/main/command">
+  <pc:docChgLst>
+    <pc:chgData name="Mohammed Rahman" userId="3e6a976e-1df1-43c6-bcc1-c9586ce4d83c" providerId="ADAL" clId="{227FD2A3-76D9-4BBB-BFDA-3F0C600BA77A}"/>
+    <pc:docChg chg="modSld">
+      <pc:chgData name="Mohammed Rahman" userId="3e6a976e-1df1-43c6-bcc1-c9586ce4d83c" providerId="ADAL" clId="{227FD2A3-76D9-4BBB-BFDA-3F0C600BA77A}" dt="2022-03-04T16:36:50.556" v="48" actId="207"/>
+      <pc:docMkLst>
+        <pc:docMk/>
+      </pc:docMkLst>
+      <pc:sldChg chg="modSp mod">
+        <pc:chgData name="Mohammed Rahman" userId="3e6a976e-1df1-43c6-bcc1-c9586ce4d83c" providerId="ADAL" clId="{227FD2A3-76D9-4BBB-BFDA-3F0C600BA77A}" dt="2022-03-04T16:35:25.225" v="37" actId="20577"/>
+        <pc:sldMkLst>
+          <pc:docMk/>
+          <pc:sldMk cId="0" sldId="256"/>
+        </pc:sldMkLst>
+        <pc:spChg chg="mod">
+          <ac:chgData name="Mohammed Rahman" userId="3e6a976e-1df1-43c6-bcc1-c9586ce4d83c" providerId="ADAL" clId="{227FD2A3-76D9-4BBB-BFDA-3F0C600BA77A}" dt="2022-03-04T16:35:25.225" v="37" actId="20577"/>
+          <ac:spMkLst>
+            <pc:docMk/>
+            <pc:sldMk cId="0" sldId="256"/>
+            <ac:spMk id="4099" creationId="{B5CF9345-A0C5-4E11-980E-1DF1F06B44A1}"/>
+          </ac:spMkLst>
+        </pc:spChg>
+      </pc:sldChg>
+      <pc:sldChg chg="modSp mod">
+        <pc:chgData name="Mohammed Rahman" userId="3e6a976e-1df1-43c6-bcc1-c9586ce4d83c" providerId="ADAL" clId="{227FD2A3-76D9-4BBB-BFDA-3F0C600BA77A}" dt="2022-03-04T16:36:00.473" v="47" actId="20577"/>
+        <pc:sldMkLst>
+          <pc:docMk/>
+          <pc:sldMk cId="1642746219" sldId="274"/>
+        </pc:sldMkLst>
+        <pc:spChg chg="mod">
+          <ac:chgData name="Mohammed Rahman" userId="3e6a976e-1df1-43c6-bcc1-c9586ce4d83c" providerId="ADAL" clId="{227FD2A3-76D9-4BBB-BFDA-3F0C600BA77A}" dt="2022-03-04T16:36:00.473" v="47" actId="20577"/>
+          <ac:spMkLst>
+            <pc:docMk/>
+            <pc:sldMk cId="1642746219" sldId="274"/>
+            <ac:spMk id="4099" creationId="{B5CF9345-A0C5-4E11-980E-1DF1F06B44A1}"/>
+          </ac:spMkLst>
+        </pc:spChg>
+      </pc:sldChg>
+      <pc:sldChg chg="modSp mod">
+        <pc:chgData name="Mohammed Rahman" userId="3e6a976e-1df1-43c6-bcc1-c9586ce4d83c" providerId="ADAL" clId="{227FD2A3-76D9-4BBB-BFDA-3F0C600BA77A}" dt="2022-03-04T16:36:50.556" v="48" actId="207"/>
+        <pc:sldMkLst>
+          <pc:docMk/>
+          <pc:sldMk cId="2445045884" sldId="277"/>
+        </pc:sldMkLst>
+        <pc:spChg chg="mod">
+          <ac:chgData name="Mohammed Rahman" userId="3e6a976e-1df1-43c6-bcc1-c9586ce4d83c" providerId="ADAL" clId="{227FD2A3-76D9-4BBB-BFDA-3F0C600BA77A}" dt="2022-03-04T16:36:50.556" v="48" actId="207"/>
+          <ac:spMkLst>
+            <pc:docMk/>
+            <pc:sldMk cId="2445045884" sldId="277"/>
+            <ac:spMk id="4099" creationId="{B5CF9345-A0C5-4E11-980E-1DF1F06B44A1}"/>
+          </ac:spMkLst>
+        </pc:spChg>
+      </pc:sldChg>
+    </pc:docChg>
+  </pc:docChgLst>
   <pc:docChgLst>
     <pc:chgData name="Mohammed Rahman" userId="3e6a976e-1df1-43c6-bcc1-c9586ce4d83c" providerId="ADAL" clId="{8939E8FB-2172-4FBE-83A7-8EB393021991}"/>
     <pc:docChg chg="modSld">
@@ -564,6 +618,11 @@
         </p:txBody>
       </p:sp>
     </p:spTree>
+    <p:extLst>
+      <p:ext uri="{BB962C8B-B14F-4D97-AF65-F5344CB8AC3E}">
+        <p14:creationId xmlns:p14="http://schemas.microsoft.com/office/powerpoint/2010/main" val="1"/>
+      </p:ext>
+    </p:extLst>
   </p:cSld>
   <p:clrMap bg1="lt1" tx1="dk1" bg2="lt2" tx2="dk2" accent1="accent1" accent2="accent2" accent3="accent3" accent4="accent4" accent5="accent5" accent6="accent6" hlink="hlink" folHlink="folHlink"/>
 </p:handoutMaster>
@@ -6634,7 +6693,7 @@
               <a:pPr>
                 <a:defRPr/>
               </a:pPr>
-              <a:t>10/19/2021</a:t>
+              <a:t>3/4/2022</a:t>
             </a:fld>
             <a:endParaRPr lang="en-US" altLang="en-US"/>
           </a:p>
@@ -7102,7 +7161,7 @@
               <a:pPr>
                 <a:defRPr/>
               </a:pPr>
-              <a:t>10/19/2021</a:t>
+              <a:t>3/4/2022</a:t>
             </a:fld>
             <a:endParaRPr lang="en-US" altLang="en-US"/>
           </a:p>
@@ -7334,7 +7393,7 @@
               <a:pPr>
                 <a:defRPr/>
               </a:pPr>
-              <a:t>10/19/2021</a:t>
+              <a:t>3/4/2022</a:t>
             </a:fld>
             <a:endParaRPr lang="en-US" altLang="en-US"/>
           </a:p>
@@ -7556,7 +7615,7 @@
               <a:pPr>
                 <a:defRPr/>
               </a:pPr>
-              <a:t>10/19/2021</a:t>
+              <a:t>3/4/2022</a:t>
             </a:fld>
             <a:endParaRPr lang="en-US" altLang="en-US"/>
           </a:p>
@@ -7801,7 +7860,7 @@
               <a:pPr>
                 <a:defRPr/>
               </a:pPr>
-              <a:t>10/19/2021</a:t>
+              <a:t>3/4/2022</a:t>
             </a:fld>
             <a:endParaRPr lang="en-US" altLang="en-US"/>
           </a:p>
@@ -8084,7 +8143,7 @@
               <a:pPr>
                 <a:defRPr/>
               </a:pPr>
-              <a:t>10/19/2021</a:t>
+              <a:t>3/4/2022</a:t>
             </a:fld>
             <a:endParaRPr lang="en-US" altLang="en-US"/>
           </a:p>
@@ -8502,7 +8561,7 @@
               <a:pPr>
                 <a:defRPr/>
               </a:pPr>
-              <a:t>10/19/2021</a:t>
+              <a:t>3/4/2022</a:t>
             </a:fld>
             <a:endParaRPr lang="en-US" altLang="en-US"/>
           </a:p>
@@ -8673,7 +8732,7 @@
               <a:pPr>
                 <a:defRPr/>
               </a:pPr>
-              <a:t>10/19/2021</a:t>
+              <a:t>3/4/2022</a:t>
             </a:fld>
             <a:endParaRPr lang="en-US" altLang="en-US"/>
           </a:p>
@@ -8822,7 +8881,7 @@
               <a:pPr>
                 <a:defRPr/>
               </a:pPr>
-              <a:t>10/19/2021</a:t>
+              <a:t>3/4/2022</a:t>
             </a:fld>
             <a:endParaRPr lang="en-US" altLang="en-US"/>
           </a:p>
@@ -9151,7 +9210,7 @@
               <a:pPr>
                 <a:defRPr/>
               </a:pPr>
-              <a:t>10/19/2021</a:t>
+              <a:t>3/4/2022</a:t>
             </a:fld>
             <a:endParaRPr lang="en-US" altLang="en-US"/>
           </a:p>
@@ -9458,7 +9517,7 @@
               <a:pPr>
                 <a:defRPr/>
               </a:pPr>
-              <a:t>10/19/2021</a:t>
+              <a:t>3/4/2022</a:t>
             </a:fld>
             <a:endParaRPr lang="en-US" altLang="en-US"/>
           </a:p>
@@ -9812,7 +9871,7 @@
               <a:pPr>
                 <a:defRPr/>
               </a:pPr>
-              <a:t>10/19/2021</a:t>
+              <a:t>3/4/2022</a:t>
             </a:fld>
             <a:endParaRPr lang="en-US" altLang="en-US"/>
           </a:p>
@@ -14136,7 +14195,7 @@
                 <a:latin typeface="Arial Narrow" panose="020B0606020202030204" pitchFamily="34" charset="0"/>
               </a:rPr>
               <a:pPr/>
-              <a:t>10/19/2021</a:t>
+              <a:t>3/4/2022</a:t>
             </a:fld>
             <a:endParaRPr lang="en-US" altLang="en-US" sz="1400">
               <a:solidFill>
@@ -14649,7 +14708,7 @@
                 <a:latin typeface="Arial Narrow" panose="020B0606020202030204" pitchFamily="34" charset="0"/>
               </a:rPr>
               <a:pPr/>
-              <a:t>10/19/2021</a:t>
+              <a:t>3/4/2022</a:t>
             </a:fld>
             <a:endParaRPr lang="en-US" altLang="en-US" sz="1400">
               <a:solidFill>
@@ -14865,7 +14924,7 @@
               <a:rPr lang="en-US" dirty="0">
                 <a:effectLst/>
               </a:rPr>
-              <a:t>Oct 23, Oct 30, Nov 13, Nov 20</a:t>
+              <a:t>Mar 5, 19, 26, Apr 2</a:t>
             </a:r>
           </a:p>
           <a:p>
@@ -14877,7 +14936,7 @@
               <a:rPr lang="en-US" dirty="0">
                 <a:effectLst/>
               </a:rPr>
-              <a:t>No class on Nov 6</a:t>
+              <a:t>No class on Mar 12</a:t>
             </a:r>
             <a:r>
               <a:rPr lang="en-US" altLang="en-US" dirty="0">
@@ -15291,7 +15350,7 @@
                 <a:latin typeface="Arial Narrow" panose="020B0606020202030204" pitchFamily="34" charset="0"/>
               </a:rPr>
               <a:pPr/>
-              <a:t>10/19/2021</a:t>
+              <a:t>3/4/2022</a:t>
             </a:fld>
             <a:endParaRPr lang="en-US" altLang="en-US" sz="1400">
               <a:solidFill>
@@ -15907,7 +15966,7 @@
                 <a:latin typeface="Arial Narrow" panose="020B0606020202030204" pitchFamily="34" charset="0"/>
               </a:rPr>
               <a:pPr/>
-              <a:t>10/19/2021</a:t>
+              <a:t>3/4/2022</a:t>
             </a:fld>
             <a:endParaRPr lang="en-US" altLang="en-US" sz="1400">
               <a:solidFill>
@@ -16466,7 +16525,7 @@
                 <a:latin typeface="Arial Narrow" panose="020B0606020202030204" pitchFamily="34" charset="0"/>
               </a:rPr>
               <a:pPr/>
-              <a:t>10/19/2021</a:t>
+              <a:t>3/4/2022</a:t>
             </a:fld>
             <a:endParaRPr lang="en-US" altLang="en-US" sz="1400">
               <a:solidFill>
@@ -16700,7 +16759,7 @@
                 </a:solidFill>
                 <a:effectLst/>
               </a:rPr>
-              <a:t>Sinclair Broadcast</a:t>
+              <a:t>Log4JShell</a:t>
             </a:r>
           </a:p>
           <a:p>
@@ -16745,7 +16804,7 @@
               <a:defRPr/>
             </a:pPr>
             <a:r>
-              <a:rPr lang="en-US" altLang="en-US" sz="2400">
+              <a:rPr lang="en-US" altLang="en-US" sz="2400" dirty="0">
                 <a:solidFill>
                   <a:srgbClr val="FFFF00"/>
                 </a:solidFill>
@@ -16753,12 +16812,6 @@
               </a:rPr>
               <a:t>Turkish Hacktivists</a:t>
             </a:r>
-            <a:endParaRPr lang="en-US" altLang="en-US" sz="2400" dirty="0">
-              <a:solidFill>
-                <a:srgbClr val="FFFF00"/>
-              </a:solidFill>
-              <a:effectLst/>
-            </a:endParaRPr>
           </a:p>
           <a:p>
             <a:pPr>
@@ -17123,7 +17176,7 @@
                 <a:latin typeface="Arial Narrow" panose="020B0606020202030204" pitchFamily="34" charset="0"/>
               </a:rPr>
               <a:pPr/>
-              <a:t>10/19/2021</a:t>
+              <a:t>3/4/2022</a:t>
             </a:fld>
             <a:endParaRPr lang="en-US" altLang="en-US" sz="1400">
               <a:solidFill>
@@ -17729,7 +17782,7 @@
                 <a:latin typeface="Arial Narrow" panose="020B0606020202030204" pitchFamily="34" charset="0"/>
               </a:rPr>
               <a:pPr/>
-              <a:t>10/19/2021</a:t>
+              <a:t>3/4/2022</a:t>
             </a:fld>
             <a:endParaRPr lang="en-US" altLang="en-US" sz="1400">
               <a:solidFill>
@@ -18416,7 +18469,7 @@
                 <a:latin typeface="Arial Narrow" panose="020B0606020202030204" pitchFamily="34" charset="0"/>
               </a:rPr>
               <a:pPr/>
-              <a:t>10/19/2021</a:t>
+              <a:t>3/4/2022</a:t>
             </a:fld>
             <a:endParaRPr lang="en-US" altLang="en-US" sz="1400">
               <a:solidFill>
@@ -18663,16 +18716,22 @@
             <a:r>
               <a:rPr lang="en-US" altLang="en-US" sz="2400" dirty="0">
                 <a:solidFill>
-                  <a:srgbClr val="FFFF00"/>
+                  <a:srgbClr val="002060"/>
                 </a:solidFill>
                 <a:effectLst/>
-                <a:hlinkClick r:id="rId3"/>
+                <a:hlinkClick r:id="rId3">
+                  <a:extLst>
+                    <a:ext uri="{A12FA001-AC4F-418D-AE19-62706E023703}">
+                      <ahyp:hlinkClr xmlns:ahyp="http://schemas.microsoft.com/office/drawing/2018/hyperlinkcolor" val="tx"/>
+                    </a:ext>
+                  </a:extLst>
+                </a:hlinkClick>
               </a:rPr>
               <a:t>https://www.ted.com/talks/carol_dweck_the_power_of_believing_that_you_can_improve#t-28343</a:t>
             </a:r>
             <a:endParaRPr lang="en-US" altLang="en-US" sz="2400" dirty="0">
               <a:solidFill>
-                <a:srgbClr val="FFFF00"/>
+                <a:srgbClr val="002060"/>
               </a:solidFill>
               <a:effectLst/>
             </a:endParaRPr>

</xml_diff>